<commit_message>
Added & Finished ITP Lab & HW 4
</commit_message>
<xml_diff>
--- a/ACM/Git_Presentation.pptx
+++ b/ACM/Git_Presentation.pptx
@@ -18,7 +18,9 @@
     <p:sldId id="268" r:id="rId12"/>
     <p:sldId id="269" r:id="rId13"/>
     <p:sldId id="270" r:id="rId14"/>
-    <p:sldId id="271" r:id="rId15"/>
+    <p:sldId id="272" r:id="rId15"/>
+    <p:sldId id="271" r:id="rId16"/>
+    <p:sldId id="273" r:id="rId17"/>
   </p:sldIdLst>
   <p:sldSz cx="9144000" cy="6858000" type="screen4x3"/>
   <p:notesSz cx="6858000" cy="9144000"/>
@@ -1374,13 +1376,6 @@
   <p:clrMapOvr>
     <a:masterClrMapping/>
   </p:clrMapOvr>
-  <p:timing>
-    <p:tnLst>
-      <p:par>
-        <p:cTn id="1" dur="indefinite" restart="never" nodeType="tmRoot"/>
-      </p:par>
-    </p:tnLst>
-  </p:timing>
 </p:sld>
 </file>
 
@@ -1597,13 +1592,6 @@
   <p:clrMapOvr>
     <a:masterClrMapping/>
   </p:clrMapOvr>
-  <p:timing>
-    <p:tnLst>
-      <p:par>
-        <p:cTn id="1" dur="indefinite" restart="never" nodeType="tmRoot"/>
-      </p:par>
-    </p:tnLst>
-  </p:timing>
 </p:sld>
 </file>
 
@@ -1751,29 +1739,8 @@
                 <a:latin typeface="Arial" panose="020B0604020202020204" pitchFamily="34" charset="0"/>
                 <a:cs typeface="Arial" panose="020B0604020202020204" pitchFamily="34" charset="0"/>
               </a:rPr>
-              <a:t>Look at the branches you’ve </a:t>
-            </a:r>
-            <a:r>
-              <a:rPr lang="en-US" sz="1400" dirty="0" smtClean="0">
-                <a:solidFill>
-                  <a:schemeClr val="bg2">
-                    <a:lumMod val="10000"/>
-                  </a:schemeClr>
-                </a:solidFill>
-                <a:latin typeface="Arial" panose="020B0604020202020204" pitchFamily="34" charset="0"/>
-                <a:cs typeface="Arial" panose="020B0604020202020204" pitchFamily="34" charset="0"/>
-              </a:rPr>
-              <a:t>visited [or all branches]</a:t>
-            </a:r>
-            <a:endParaRPr lang="en-US" sz="1400" dirty="0" smtClean="0">
-              <a:solidFill>
-                <a:schemeClr val="bg2">
-                  <a:lumMod val="10000"/>
-                </a:schemeClr>
-              </a:solidFill>
-              <a:latin typeface="Arial" panose="020B0604020202020204" pitchFamily="34" charset="0"/>
-              <a:cs typeface="Arial" panose="020B0604020202020204" pitchFamily="34" charset="0"/>
-            </a:endParaRPr>
+              <a:t>Look at the branches you’ve visited [or all branches]</a:t>
+            </a:r>
           </a:p>
           <a:p>
             <a:pPr marL="342900" lvl="0" indent="-342900">
@@ -2431,13 +2398,6 @@
   <p:clrMapOvr>
     <a:masterClrMapping/>
   </p:clrMapOvr>
-  <p:timing>
-    <p:tnLst>
-      <p:par>
-        <p:cTn id="1" dur="indefinite" restart="never" nodeType="tmRoot"/>
-      </p:par>
-    </p:tnLst>
-  </p:timing>
 </p:sld>
 </file>
 
@@ -2607,29 +2567,8 @@
                 <a:latin typeface="Arial"/>
                 <a:cs typeface="Arial"/>
               </a:rPr>
-              <a:t>Deletes all your local </a:t>
-            </a:r>
-            <a:r>
-              <a:rPr lang="en-US" sz="1400" dirty="0" smtClean="0">
-                <a:solidFill>
-                  <a:schemeClr val="bg2">
-                    <a:lumMod val="10000"/>
-                  </a:schemeClr>
-                </a:solidFill>
-                <a:latin typeface="Arial"/>
-                <a:cs typeface="Arial"/>
-              </a:rPr>
-              <a:t>changes and revert to most recent commit state</a:t>
-            </a:r>
-            <a:endParaRPr lang="en-US" sz="1400" dirty="0" smtClean="0">
-              <a:solidFill>
-                <a:schemeClr val="bg2">
-                  <a:lumMod val="10000"/>
-                </a:schemeClr>
-              </a:solidFill>
-              <a:latin typeface="Arial"/>
-              <a:cs typeface="Arial"/>
-            </a:endParaRPr>
+              <a:t>Deletes all your local changes and revert to most recent commit state</a:t>
+            </a:r>
           </a:p>
           <a:p>
             <a:pPr marL="342900" lvl="0" indent="-342900">
@@ -2720,29 +2659,8 @@
                 <a:latin typeface="Arial"/>
                 <a:cs typeface="Arial"/>
               </a:rPr>
-              <a:t> to push with your changes (I can’t see why you would ever want to do </a:t>
-            </a:r>
-            <a:r>
-              <a:rPr lang="en-US" sz="1400" dirty="0" smtClean="0">
-                <a:solidFill>
-                  <a:schemeClr val="bg2">
-                    <a:lumMod val="10000"/>
-                  </a:schemeClr>
-                </a:solidFill>
-                <a:latin typeface="Arial"/>
-                <a:cs typeface="Arial"/>
-              </a:rPr>
-              <a:t>this, unless you want to be mean to your teammates)</a:t>
-            </a:r>
-            <a:endParaRPr lang="en-US" sz="1400" dirty="0" smtClean="0">
-              <a:solidFill>
-                <a:schemeClr val="bg2">
-                  <a:lumMod val="10000"/>
-                </a:schemeClr>
-              </a:solidFill>
-              <a:latin typeface="Arial"/>
-              <a:cs typeface="Arial"/>
-            </a:endParaRPr>
+              <a:t> to push with your changes (I can’t see why you would ever want to do this, unless you want to be mean to your teammates)</a:t>
+            </a:r>
           </a:p>
           <a:p>
             <a:pPr marL="342900" indent="-342900">
@@ -2754,7 +2672,7 @@
               <a:defRPr/>
             </a:pPr>
             <a:r>
-              <a:rPr lang="en-US" sz="1400" dirty="0" smtClean="0">
+              <a:rPr lang="en-US" sz="1400" strike="sngStrike" dirty="0" smtClean="0">
                 <a:solidFill>
                   <a:schemeClr val="bg2">
                     <a:lumMod val="10000"/>
@@ -2776,7 +2694,7 @@
               <a:defRPr/>
             </a:pPr>
             <a:r>
-              <a:rPr lang="en-US" sz="1400" dirty="0" smtClean="0">
+              <a:rPr lang="en-US" sz="1400" strike="sngStrike" dirty="0" smtClean="0">
                 <a:solidFill>
                   <a:schemeClr val="bg2">
                     <a:lumMod val="10000"/>
@@ -2788,7 +2706,7 @@
               <a:t>$</a:t>
             </a:r>
             <a:r>
-              <a:rPr lang="en-US" sz="1400" dirty="0" err="1" smtClean="0">
+              <a:rPr lang="en-US" sz="1400" strike="sngStrike" dirty="0" err="1" smtClean="0">
                 <a:solidFill>
                   <a:schemeClr val="bg2">
                     <a:lumMod val="10000"/>
@@ -2800,7 +2718,7 @@
               <a:t>git</a:t>
             </a:r>
             <a:r>
-              <a:rPr lang="en-US" sz="1400" dirty="0" smtClean="0">
+              <a:rPr lang="en-US" sz="1400" strike="sngStrike" dirty="0" smtClean="0">
                 <a:solidFill>
                   <a:schemeClr val="bg2">
                     <a:lumMod val="10000"/>
@@ -2812,7 +2730,7 @@
               <a:t> checkout &lt;</a:t>
             </a:r>
             <a:r>
-              <a:rPr lang="en-US" sz="1400" dirty="0" err="1" smtClean="0">
+              <a:rPr lang="en-US" sz="1400" strike="sngStrike" dirty="0" err="1" smtClean="0">
                 <a:solidFill>
                   <a:schemeClr val="bg2">
                     <a:lumMod val="10000"/>
@@ -2824,7 +2742,7 @@
               <a:t>commit_id</a:t>
             </a:r>
             <a:r>
-              <a:rPr lang="en-US" sz="1400" dirty="0" smtClean="0">
+              <a:rPr lang="en-US" sz="1400" strike="sngStrike" dirty="0" smtClean="0">
                 <a:solidFill>
                   <a:schemeClr val="bg2">
                     <a:lumMod val="10000"/>
@@ -2846,7 +2764,7 @@
               <a:defRPr/>
             </a:pPr>
             <a:r>
-              <a:rPr lang="en-US" sz="1400" dirty="0" smtClean="0">
+              <a:rPr lang="en-US" sz="1400" strike="sngStrike" dirty="0" smtClean="0">
                 <a:solidFill>
                   <a:schemeClr val="bg2">
                     <a:lumMod val="10000"/>
@@ -2858,7 +2776,7 @@
               <a:t>$</a:t>
             </a:r>
             <a:r>
-              <a:rPr lang="en-US" sz="1400" dirty="0" err="1" smtClean="0">
+              <a:rPr lang="en-US" sz="1400" strike="sngStrike" dirty="0" err="1" smtClean="0">
                 <a:solidFill>
                   <a:schemeClr val="bg2">
                     <a:lumMod val="10000"/>
@@ -2870,7 +2788,7 @@
               <a:t>git</a:t>
             </a:r>
             <a:r>
-              <a:rPr lang="en-US" sz="1400" dirty="0" smtClean="0">
+              <a:rPr lang="en-US" sz="1400" strike="sngStrike" dirty="0" smtClean="0">
                 <a:solidFill>
                   <a:schemeClr val="bg2">
                     <a:lumMod val="10000"/>
@@ -2882,7 +2800,7 @@
               <a:t> checkout –b </a:t>
             </a:r>
             <a:r>
-              <a:rPr lang="en-US" sz="1400" dirty="0" err="1" smtClean="0">
+              <a:rPr lang="en-US" sz="1400" strike="sngStrike" dirty="0" err="1" smtClean="0">
                 <a:solidFill>
                   <a:schemeClr val="bg2">
                     <a:lumMod val="10000"/>
@@ -2893,7 +2811,7 @@
               </a:rPr>
               <a:t>new_master</a:t>
             </a:r>
-            <a:endParaRPr lang="en-US" sz="1400" dirty="0">
+            <a:endParaRPr lang="en-US" sz="1400" strike="sngStrike" dirty="0">
               <a:solidFill>
                 <a:schemeClr val="bg2">
                   <a:lumMod val="10000"/>
@@ -2913,7 +2831,7 @@
               <a:defRPr/>
             </a:pPr>
             <a:r>
-              <a:rPr lang="en-US" sz="1400" dirty="0" smtClean="0">
+              <a:rPr lang="en-US" sz="1400" strike="sngStrike" dirty="0" smtClean="0">
                 <a:solidFill>
                   <a:schemeClr val="bg2">
                     <a:lumMod val="10000"/>
@@ -2925,7 +2843,7 @@
               <a:t>$</a:t>
             </a:r>
             <a:r>
-              <a:rPr lang="en-US" sz="1400" dirty="0" err="1" smtClean="0">
+              <a:rPr lang="en-US" sz="1400" strike="sngStrike" dirty="0" err="1" smtClean="0">
                 <a:solidFill>
                   <a:schemeClr val="bg2">
                     <a:lumMod val="10000"/>
@@ -2937,40 +2855,16 @@
               <a:t>git</a:t>
             </a:r>
             <a:r>
-              <a:rPr lang="en-US" sz="1400" dirty="0" smtClean="0">
-                <a:solidFill>
-                  <a:schemeClr val="bg2">
-                    <a:lumMod val="10000"/>
-                  </a:schemeClr>
-                </a:solidFill>
-                <a:latin typeface="Courier" pitchFamily="49" charset="0"/>
-                <a:cs typeface="Arial"/>
-              </a:rPr>
-              <a:t> </a:t>
-            </a:r>
-            <a:r>
-              <a:rPr lang="en-US" sz="1400" dirty="0" smtClean="0">
-                <a:solidFill>
-                  <a:schemeClr val="bg2">
-                    <a:lumMod val="10000"/>
-                  </a:schemeClr>
-                </a:solidFill>
-                <a:latin typeface="Courier" pitchFamily="49" charset="0"/>
-                <a:cs typeface="Arial"/>
-              </a:rPr>
-              <a:t>branch </a:t>
-            </a:r>
-            <a:r>
-              <a:rPr lang="en-US" sz="1400" dirty="0" smtClean="0">
-                <a:solidFill>
-                  <a:schemeClr val="bg2">
-                    <a:lumMod val="10000"/>
-                  </a:schemeClr>
-                </a:solidFill>
-                <a:latin typeface="Courier" pitchFamily="49" charset="0"/>
-                <a:cs typeface="Arial"/>
-              </a:rPr>
-              <a:t>–d master</a:t>
+              <a:rPr lang="en-US" sz="1400" strike="sngStrike" dirty="0" smtClean="0">
+                <a:solidFill>
+                  <a:schemeClr val="bg2">
+                    <a:lumMod val="10000"/>
+                  </a:schemeClr>
+                </a:solidFill>
+                <a:latin typeface="Courier" pitchFamily="49" charset="0"/>
+                <a:cs typeface="Arial"/>
+              </a:rPr>
+              <a:t> branch –d master</a:t>
             </a:r>
           </a:p>
           <a:p>
@@ -2983,28 +2877,16 @@
               <a:defRPr/>
             </a:pPr>
             <a:r>
-              <a:rPr lang="en-US" sz="1400" b="1" dirty="0" smtClean="0">
-                <a:solidFill>
-                  <a:schemeClr val="bg2">
-                    <a:lumMod val="10000"/>
-                  </a:schemeClr>
-                </a:solidFill>
-                <a:latin typeface="Arial"/>
-                <a:cs typeface="Arial"/>
-              </a:rPr>
-              <a:t>THIS IS PAST THE POINT OF </a:t>
-            </a:r>
-            <a:r>
-              <a:rPr lang="en-US" sz="1400" b="1" dirty="0" smtClean="0">
-                <a:solidFill>
-                  <a:schemeClr val="bg2">
-                    <a:lumMod val="10000"/>
-                  </a:schemeClr>
-                </a:solidFill>
-                <a:latin typeface="Arial"/>
-                <a:cs typeface="Arial"/>
-              </a:rPr>
-              <a:t>NO RETURN</a:t>
+              <a:rPr lang="en-US" sz="1400" b="1" strike="sngStrike" dirty="0" smtClean="0">
+                <a:solidFill>
+                  <a:schemeClr val="bg2">
+                    <a:lumMod val="10000"/>
+                  </a:schemeClr>
+                </a:solidFill>
+                <a:latin typeface="Arial"/>
+                <a:cs typeface="Arial"/>
+              </a:rPr>
+              <a:t>THIS IS PAST THE POINT OF NO RETURN</a:t>
             </a:r>
           </a:p>
           <a:p>
@@ -3017,7 +2899,7 @@
               <a:defRPr/>
             </a:pPr>
             <a:r>
-              <a:rPr lang="en-US" sz="1400" dirty="0" smtClean="0">
+              <a:rPr lang="en-US" sz="1400" strike="sngStrike" dirty="0" smtClean="0">
                 <a:solidFill>
                   <a:schemeClr val="bg2">
                     <a:lumMod val="10000"/>
@@ -3029,7 +2911,7 @@
               <a:t>$</a:t>
             </a:r>
             <a:r>
-              <a:rPr lang="en-US" sz="1400" dirty="0" err="1" smtClean="0">
+              <a:rPr lang="en-US" sz="1400" strike="sngStrike" dirty="0" err="1" smtClean="0">
                 <a:solidFill>
                   <a:schemeClr val="bg2">
                     <a:lumMod val="10000"/>
@@ -3041,7 +2923,7 @@
               <a:t>git</a:t>
             </a:r>
             <a:r>
-              <a:rPr lang="en-US" sz="1400" dirty="0" smtClean="0">
+              <a:rPr lang="en-US" sz="1400" strike="sngStrike" dirty="0" smtClean="0">
                 <a:solidFill>
                   <a:schemeClr val="bg2">
                     <a:lumMod val="10000"/>
@@ -3053,7 +2935,7 @@
               <a:t> branch –mv </a:t>
             </a:r>
             <a:r>
-              <a:rPr lang="en-US" sz="1400" dirty="0" err="1" smtClean="0">
+              <a:rPr lang="en-US" sz="1400" strike="sngStrike" dirty="0" err="1" smtClean="0">
                 <a:solidFill>
                   <a:schemeClr val="bg2">
                     <a:lumMod val="10000"/>
@@ -3065,7 +2947,7 @@
               <a:t>new_mater</a:t>
             </a:r>
             <a:r>
-              <a:rPr lang="en-US" sz="1400" dirty="0" smtClean="0">
+              <a:rPr lang="en-US" sz="1400" strike="sngStrike" dirty="0" smtClean="0">
                 <a:solidFill>
                   <a:schemeClr val="bg2">
                     <a:lumMod val="10000"/>
@@ -3087,7 +2969,7 @@
               <a:defRPr/>
             </a:pPr>
             <a:r>
-              <a:rPr lang="en-US" sz="1400" b="1" dirty="0" smtClean="0">
+              <a:rPr lang="en-US" sz="1400" b="1" strike="sngStrike" dirty="0" smtClean="0">
                 <a:solidFill>
                   <a:schemeClr val="bg2">
                     <a:lumMod val="10000"/>
@@ -3109,40 +2991,16 @@
               <a:defRPr/>
             </a:pPr>
             <a:r>
-              <a:rPr lang="en-US" sz="1400" b="1" dirty="0" smtClean="0">
-                <a:solidFill>
-                  <a:schemeClr val="bg2">
-                    <a:lumMod val="10000"/>
-                  </a:schemeClr>
-                </a:solidFill>
-                <a:latin typeface="Arial"/>
-                <a:cs typeface="Arial"/>
-              </a:rPr>
-              <a:t>I DO NOT ENDORSE THIS. DO THIS AT YOUR OWN RISK. I AM NOT RESPNOSIBLE FOR ANY DAMAGES CAUSED </a:t>
-            </a:r>
-            <a:r>
-              <a:rPr lang="en-US" sz="1400" b="1" dirty="0" smtClean="0">
-                <a:solidFill>
-                  <a:schemeClr val="bg2">
-                    <a:lumMod val="10000"/>
-                  </a:schemeClr>
-                </a:solidFill>
-                <a:latin typeface="Arial"/>
-                <a:cs typeface="Arial"/>
-              </a:rPr>
-              <a:t>BY </a:t>
-            </a:r>
-            <a:r>
-              <a:rPr lang="en-US" sz="1400" b="1" dirty="0" smtClean="0">
-                <a:solidFill>
-                  <a:schemeClr val="bg2">
-                    <a:lumMod val="10000"/>
-                  </a:schemeClr>
-                </a:solidFill>
-                <a:latin typeface="Arial"/>
-                <a:cs typeface="Arial"/>
-              </a:rPr>
-              <a:t>YOU DINKING AROUND WITH CHANGING YOUR MASTER BRANCH</a:t>
+              <a:rPr lang="en-US" sz="1400" b="1" strike="sngStrike" dirty="0" smtClean="0">
+                <a:solidFill>
+                  <a:schemeClr val="bg2">
+                    <a:lumMod val="10000"/>
+                  </a:schemeClr>
+                </a:solidFill>
+                <a:latin typeface="Arial"/>
+                <a:cs typeface="Arial"/>
+              </a:rPr>
+              <a:t>I DO NOT ENDORSE THIS. DO THIS AT YOUR OWN RISK. I AM NOT RESPNOSIBLE FOR ANY DAMAGES CAUSED BY YOU DINKING AROUND WITH CHANGING YOUR MASTER BRANCH</a:t>
             </a:r>
           </a:p>
         </p:txBody>
@@ -3645,6 +3503,449 @@
       </p:grpSpPr>
       <p:sp>
         <p:nvSpPr>
+          <p:cNvPr id="2" name="TextBox 1"/>
+          <p:cNvSpPr txBox="1"/>
+          <p:nvPr/>
+        </p:nvSpPr>
+        <p:spPr>
+          <a:xfrm>
+            <a:off x="943687" y="977900"/>
+            <a:ext cx="7399800" cy="4062651"/>
+          </a:xfrm>
+          <a:prstGeom prst="rect">
+            <a:avLst/>
+          </a:prstGeom>
+          <a:noFill/>
+        </p:spPr>
+        <p:txBody>
+          <a:bodyPr wrap="square" rtlCol="0">
+            <a:spAutoFit/>
+          </a:bodyPr>
+          <a:lstStyle/>
+          <a:p>
+            <a:pPr lvl="0">
+              <a:spcBef>
+                <a:spcPct val="0"/>
+              </a:spcBef>
+              <a:defRPr/>
+            </a:pPr>
+            <a:r>
+              <a:rPr lang="en-US" sz="2400" b="1" dirty="0" smtClean="0">
+                <a:latin typeface="Arial"/>
+                <a:cs typeface="Arial"/>
+              </a:rPr>
+              <a:t>Changing </a:t>
+            </a:r>
+            <a:r>
+              <a:rPr lang="en-US" sz="2400" b="1" dirty="0" err="1" smtClean="0">
+                <a:latin typeface="Arial"/>
+                <a:cs typeface="Arial"/>
+              </a:rPr>
+              <a:t>Git</a:t>
+            </a:r>
+            <a:r>
+              <a:rPr lang="en-US" sz="2400" b="1" dirty="0" smtClean="0">
+                <a:latin typeface="Arial"/>
+                <a:cs typeface="Arial"/>
+              </a:rPr>
+              <a:t> master branch workaround</a:t>
+            </a:r>
+            <a:endParaRPr lang="en-US" sz="2400" b="1" dirty="0" smtClean="0">
+              <a:latin typeface="Arial"/>
+              <a:cs typeface="Arial"/>
+            </a:endParaRPr>
+          </a:p>
+          <a:p>
+            <a:pPr lvl="0">
+              <a:spcBef>
+                <a:spcPct val="0"/>
+              </a:spcBef>
+              <a:defRPr/>
+            </a:pPr>
+            <a:endParaRPr lang="en-US" sz="2400" b="1" dirty="0" smtClean="0">
+              <a:latin typeface="Arial"/>
+              <a:cs typeface="Arial"/>
+            </a:endParaRPr>
+          </a:p>
+          <a:p>
+            <a:pPr marL="342900" lvl="0" indent="-342900">
+              <a:spcBef>
+                <a:spcPct val="0"/>
+              </a:spcBef>
+              <a:buFont typeface="Arial" panose="020B0604020202020204" pitchFamily="34" charset="0"/>
+              <a:buChar char="•"/>
+              <a:defRPr/>
+            </a:pPr>
+            <a:r>
+              <a:rPr lang="en-US" sz="1400" dirty="0" smtClean="0">
+                <a:solidFill>
+                  <a:schemeClr val="bg2">
+                    <a:lumMod val="10000"/>
+                  </a:schemeClr>
+                </a:solidFill>
+                <a:latin typeface="Arial" panose="020B0604020202020204" pitchFamily="34" charset="0"/>
+                <a:cs typeface="Arial" panose="020B0604020202020204" pitchFamily="34" charset="0"/>
+              </a:rPr>
+              <a:t>Contact all your teammates about reverting master branch to a previous commit, make sure they all agree and save the changes they want to make to their local machine (not in the repo)</a:t>
+            </a:r>
+          </a:p>
+          <a:p>
+            <a:pPr marL="342900" lvl="0" indent="-342900">
+              <a:spcBef>
+                <a:spcPct val="0"/>
+              </a:spcBef>
+              <a:buFont typeface="Arial" panose="020B0604020202020204" pitchFamily="34" charset="0"/>
+              <a:buChar char="•"/>
+              <a:defRPr/>
+            </a:pPr>
+            <a:r>
+              <a:rPr lang="en-US" sz="1400" dirty="0" smtClean="0">
+                <a:solidFill>
+                  <a:schemeClr val="bg2">
+                    <a:lumMod val="10000"/>
+                  </a:schemeClr>
+                </a:solidFill>
+                <a:latin typeface="Arial" panose="020B0604020202020204" pitchFamily="34" charset="0"/>
+                <a:cs typeface="Arial" panose="020B0604020202020204" pitchFamily="34" charset="0"/>
+              </a:rPr>
+              <a:t>Make sure only one person is going to do this process</a:t>
+            </a:r>
+            <a:endParaRPr lang="en-US" sz="1400" dirty="0">
+              <a:solidFill>
+                <a:schemeClr val="bg2">
+                  <a:lumMod val="10000"/>
+                </a:schemeClr>
+              </a:solidFill>
+              <a:latin typeface="Arial" panose="020B0604020202020204" pitchFamily="34" charset="0"/>
+              <a:cs typeface="Arial" panose="020B0604020202020204" pitchFamily="34" charset="0"/>
+            </a:endParaRPr>
+          </a:p>
+          <a:p>
+            <a:pPr marL="342900" lvl="0" indent="-342900">
+              <a:spcBef>
+                <a:spcPct val="0"/>
+              </a:spcBef>
+              <a:buFont typeface="Arial" panose="020B0604020202020204" pitchFamily="34" charset="0"/>
+              <a:buChar char="•"/>
+              <a:defRPr/>
+            </a:pPr>
+            <a:r>
+              <a:rPr lang="en-US" sz="1400" dirty="0" smtClean="0">
+                <a:solidFill>
+                  <a:schemeClr val="bg2">
+                    <a:lumMod val="10000"/>
+                  </a:schemeClr>
+                </a:solidFill>
+                <a:latin typeface="Arial" panose="020B0604020202020204" pitchFamily="34" charset="0"/>
+                <a:cs typeface="Arial" panose="020B0604020202020204" pitchFamily="34" charset="0"/>
+              </a:rPr>
+              <a:t>Checkout the commit you want to revert back to</a:t>
+            </a:r>
+          </a:p>
+          <a:p>
+            <a:pPr marL="342900" lvl="0" indent="-342900">
+              <a:spcBef>
+                <a:spcPct val="0"/>
+              </a:spcBef>
+              <a:buFont typeface="Arial" panose="020B0604020202020204" pitchFamily="34" charset="0"/>
+              <a:buChar char="•"/>
+              <a:defRPr/>
+            </a:pPr>
+            <a:r>
+              <a:rPr lang="en-US" sz="1400" dirty="0" smtClean="0">
+                <a:solidFill>
+                  <a:schemeClr val="bg2">
+                    <a:lumMod val="10000"/>
+                  </a:schemeClr>
+                </a:solidFill>
+                <a:latin typeface="Arial" panose="020B0604020202020204" pitchFamily="34" charset="0"/>
+                <a:cs typeface="Arial" panose="020B0604020202020204" pitchFamily="34" charset="0"/>
+              </a:rPr>
+              <a:t>Copy the contents of the repository to your local machine</a:t>
+            </a:r>
+          </a:p>
+          <a:p>
+            <a:pPr marL="342900" lvl="0" indent="-342900">
+              <a:spcBef>
+                <a:spcPct val="0"/>
+              </a:spcBef>
+              <a:buFont typeface="Arial" panose="020B0604020202020204" pitchFamily="34" charset="0"/>
+              <a:buChar char="•"/>
+              <a:defRPr/>
+            </a:pPr>
+            <a:r>
+              <a:rPr lang="en-US" sz="1400" dirty="0" smtClean="0">
+                <a:solidFill>
+                  <a:schemeClr val="bg2">
+                    <a:lumMod val="10000"/>
+                  </a:schemeClr>
+                </a:solidFill>
+                <a:latin typeface="Arial" panose="020B0604020202020204" pitchFamily="34" charset="0"/>
+                <a:cs typeface="Arial" panose="020B0604020202020204" pitchFamily="34" charset="0"/>
+              </a:rPr>
+              <a:t>Checkout the master branch</a:t>
+            </a:r>
+          </a:p>
+          <a:p>
+            <a:pPr marL="342900" lvl="0" indent="-342900">
+              <a:spcBef>
+                <a:spcPct val="0"/>
+              </a:spcBef>
+              <a:buFont typeface="Arial" panose="020B0604020202020204" pitchFamily="34" charset="0"/>
+              <a:buChar char="•"/>
+              <a:defRPr/>
+            </a:pPr>
+            <a:r>
+              <a:rPr lang="en-US" sz="1400" dirty="0" smtClean="0">
+                <a:solidFill>
+                  <a:schemeClr val="bg2">
+                    <a:lumMod val="10000"/>
+                  </a:schemeClr>
+                </a:solidFill>
+                <a:latin typeface="Arial" panose="020B0604020202020204" pitchFamily="34" charset="0"/>
+                <a:cs typeface="Arial" panose="020B0604020202020204" pitchFamily="34" charset="0"/>
+              </a:rPr>
+              <a:t>Delete all the files in the master branch</a:t>
+            </a:r>
+          </a:p>
+          <a:p>
+            <a:pPr marL="342900" lvl="0" indent="-342900">
+              <a:spcBef>
+                <a:spcPct val="0"/>
+              </a:spcBef>
+              <a:buFont typeface="Arial" panose="020B0604020202020204" pitchFamily="34" charset="0"/>
+              <a:buChar char="•"/>
+              <a:defRPr/>
+            </a:pPr>
+            <a:r>
+              <a:rPr lang="en-US" sz="1400" dirty="0" smtClean="0">
+                <a:solidFill>
+                  <a:schemeClr val="bg2">
+                    <a:lumMod val="10000"/>
+                  </a:schemeClr>
+                </a:solidFill>
+                <a:latin typeface="Arial" panose="020B0604020202020204" pitchFamily="34" charset="0"/>
+                <a:cs typeface="Arial" panose="020B0604020202020204" pitchFamily="34" charset="0"/>
+              </a:rPr>
+              <a:t>Replace all the files in the repository with the contents of the previous commit you saved onto your local machine</a:t>
+            </a:r>
+          </a:p>
+          <a:p>
+            <a:pPr marL="342900" lvl="0" indent="-342900">
+              <a:spcBef>
+                <a:spcPct val="0"/>
+              </a:spcBef>
+              <a:buFont typeface="Arial" panose="020B0604020202020204" pitchFamily="34" charset="0"/>
+              <a:buChar char="•"/>
+              <a:defRPr/>
+            </a:pPr>
+            <a:r>
+              <a:rPr lang="en-US" sz="1400" dirty="0" smtClean="0">
+                <a:solidFill>
+                  <a:schemeClr val="bg2">
+                    <a:lumMod val="10000"/>
+                  </a:schemeClr>
+                </a:solidFill>
+                <a:latin typeface="Arial" panose="020B0604020202020204" pitchFamily="34" charset="0"/>
+                <a:cs typeface="Arial" panose="020B0604020202020204" pitchFamily="34" charset="0"/>
+              </a:rPr>
+              <a:t>Run:</a:t>
+            </a:r>
+          </a:p>
+          <a:p>
+            <a:pPr marL="800100" lvl="1" indent="-342900">
+              <a:spcBef>
+                <a:spcPct val="0"/>
+              </a:spcBef>
+              <a:buFont typeface="Arial" panose="020B0604020202020204" pitchFamily="34" charset="0"/>
+              <a:buChar char="•"/>
+              <a:defRPr/>
+            </a:pPr>
+            <a:r>
+              <a:rPr lang="en-US" sz="1400" dirty="0" smtClean="0">
+                <a:solidFill>
+                  <a:schemeClr val="bg2">
+                    <a:lumMod val="10000"/>
+                  </a:schemeClr>
+                </a:solidFill>
+                <a:latin typeface="Courier" pitchFamily="49" charset="0"/>
+                <a:cs typeface="Arial"/>
+              </a:rPr>
+              <a:t>$</a:t>
+            </a:r>
+            <a:r>
+              <a:rPr lang="en-US" sz="1400" dirty="0" err="1" smtClean="0">
+                <a:solidFill>
+                  <a:schemeClr val="bg2">
+                    <a:lumMod val="10000"/>
+                  </a:schemeClr>
+                </a:solidFill>
+                <a:latin typeface="Courier" pitchFamily="49" charset="0"/>
+                <a:cs typeface="Arial"/>
+              </a:rPr>
+              <a:t>git</a:t>
+            </a:r>
+            <a:r>
+              <a:rPr lang="en-US" sz="1400" dirty="0" smtClean="0">
+                <a:solidFill>
+                  <a:schemeClr val="bg2">
+                    <a:lumMod val="10000"/>
+                  </a:schemeClr>
+                </a:solidFill>
+                <a:latin typeface="Courier" pitchFamily="49" charset="0"/>
+                <a:cs typeface="Arial"/>
+              </a:rPr>
+              <a:t> add .</a:t>
+            </a:r>
+          </a:p>
+          <a:p>
+            <a:pPr marL="800100" lvl="1" indent="-342900">
+              <a:spcBef>
+                <a:spcPct val="0"/>
+              </a:spcBef>
+              <a:buFont typeface="Arial" panose="020B0604020202020204" pitchFamily="34" charset="0"/>
+              <a:buChar char="•"/>
+              <a:defRPr/>
+            </a:pPr>
+            <a:r>
+              <a:rPr lang="en-US" sz="1400" dirty="0" smtClean="0">
+                <a:solidFill>
+                  <a:schemeClr val="bg2">
+                    <a:lumMod val="10000"/>
+                  </a:schemeClr>
+                </a:solidFill>
+                <a:latin typeface="Courier" pitchFamily="49" charset="0"/>
+                <a:cs typeface="Arial"/>
+              </a:rPr>
+              <a:t>$</a:t>
+            </a:r>
+            <a:r>
+              <a:rPr lang="en-US" sz="1400" dirty="0" err="1" smtClean="0">
+                <a:solidFill>
+                  <a:schemeClr val="bg2">
+                    <a:lumMod val="10000"/>
+                  </a:schemeClr>
+                </a:solidFill>
+                <a:latin typeface="Courier" pitchFamily="49" charset="0"/>
+                <a:cs typeface="Arial"/>
+              </a:rPr>
+              <a:t>git</a:t>
+            </a:r>
+            <a:r>
+              <a:rPr lang="en-US" sz="1400" dirty="0" smtClean="0">
+                <a:solidFill>
+                  <a:schemeClr val="bg2">
+                    <a:lumMod val="10000"/>
+                  </a:schemeClr>
+                </a:solidFill>
+                <a:latin typeface="Courier" pitchFamily="49" charset="0"/>
+                <a:cs typeface="Arial"/>
+              </a:rPr>
+              <a:t> commit –m “&lt;message&gt;”</a:t>
+            </a:r>
+          </a:p>
+          <a:p>
+            <a:pPr marL="800100" lvl="1" indent="-342900">
+              <a:spcBef>
+                <a:spcPct val="0"/>
+              </a:spcBef>
+              <a:buFont typeface="Arial" panose="020B0604020202020204" pitchFamily="34" charset="0"/>
+              <a:buChar char="•"/>
+              <a:defRPr/>
+            </a:pPr>
+            <a:r>
+              <a:rPr lang="en-US" sz="1400" dirty="0" smtClean="0">
+                <a:solidFill>
+                  <a:schemeClr val="bg2">
+                    <a:lumMod val="10000"/>
+                  </a:schemeClr>
+                </a:solidFill>
+                <a:latin typeface="Courier" pitchFamily="49" charset="0"/>
+                <a:cs typeface="Arial"/>
+              </a:rPr>
+              <a:t>$</a:t>
+            </a:r>
+            <a:r>
+              <a:rPr lang="en-US" sz="1400" dirty="0" err="1" smtClean="0">
+                <a:solidFill>
+                  <a:schemeClr val="bg2">
+                    <a:lumMod val="10000"/>
+                  </a:schemeClr>
+                </a:solidFill>
+                <a:latin typeface="Courier" pitchFamily="49" charset="0"/>
+                <a:cs typeface="Arial"/>
+              </a:rPr>
+              <a:t>git</a:t>
+            </a:r>
+            <a:r>
+              <a:rPr lang="en-US" sz="1400" dirty="0" smtClean="0">
+                <a:solidFill>
+                  <a:schemeClr val="bg2">
+                    <a:lumMod val="10000"/>
+                  </a:schemeClr>
+                </a:solidFill>
+                <a:latin typeface="Courier" pitchFamily="49" charset="0"/>
+                <a:cs typeface="Arial"/>
+              </a:rPr>
+              <a:t> push (possibly –f)</a:t>
+            </a:r>
+          </a:p>
+          <a:p>
+            <a:pPr marL="342900" indent="-342900">
+              <a:spcBef>
+                <a:spcPct val="0"/>
+              </a:spcBef>
+              <a:buFont typeface="Arial" panose="020B0604020202020204" pitchFamily="34" charset="0"/>
+              <a:buChar char="•"/>
+              <a:defRPr/>
+            </a:pPr>
+            <a:r>
+              <a:rPr lang="en-US" sz="1400" dirty="0" smtClean="0">
+                <a:solidFill>
+                  <a:schemeClr val="bg2">
+                    <a:lumMod val="10000"/>
+                  </a:schemeClr>
+                </a:solidFill>
+                <a:latin typeface="Arial" panose="020B0604020202020204" pitchFamily="34" charset="0"/>
+                <a:cs typeface="Arial" panose="020B0604020202020204" pitchFamily="34" charset="0"/>
+              </a:rPr>
+              <a:t>Once again, DO THIS AT YOUR OWN RISK</a:t>
+            </a:r>
+          </a:p>
+        </p:txBody>
+      </p:sp>
+    </p:spTree>
+    <p:extLst>
+      <p:ext uri="{BB962C8B-B14F-4D97-AF65-F5344CB8AC3E}">
+        <p14:creationId xmlns:p14="http://schemas.microsoft.com/office/powerpoint/2010/main" val="1508222036"/>
+      </p:ext>
+    </p:extLst>
+  </p:cSld>
+  <p:clrMapOvr>
+    <a:masterClrMapping/>
+  </p:clrMapOvr>
+</p:sld>
+</file>
+
+<file path=ppt/slides/slide14.xml><?xml version="1.0" encoding="utf-8"?>
+<p:sld xmlns:a="http://schemas.openxmlformats.org/drawingml/2006/main" xmlns:r="http://schemas.openxmlformats.org/officeDocument/2006/relationships" xmlns:p="http://schemas.openxmlformats.org/presentationml/2006/main">
+  <p:cSld>
+    <p:spTree>
+      <p:nvGrpSpPr>
+        <p:cNvPr id="1" name=""/>
+        <p:cNvGrpSpPr/>
+        <p:nvPr/>
+      </p:nvGrpSpPr>
+      <p:grpSpPr>
+        <a:xfrm>
+          <a:off x="0" y="0"/>
+          <a:ext cx="0" cy="0"/>
+          <a:chOff x="0" y="0"/>
+          <a:chExt cx="0" cy="0"/>
+        </a:xfrm>
+      </p:grpSpPr>
+      <p:sp>
+        <p:nvSpPr>
           <p:cNvPr id="4" name="Title 1"/>
           <p:cNvSpPr txBox="1">
             <a:spLocks/>
@@ -3858,13 +4159,399 @@
   <p:clrMapOvr>
     <a:masterClrMapping/>
   </p:clrMapOvr>
-  <p:timing>
-    <p:tnLst>
-      <p:par>
-        <p:cTn id="1" dur="indefinite" restart="never" nodeType="tmRoot"/>
-      </p:par>
-    </p:tnLst>
-  </p:timing>
+</p:sld>
+</file>
+
+<file path=ppt/slides/slide15.xml><?xml version="1.0" encoding="utf-8"?>
+<p:sld xmlns:a="http://schemas.openxmlformats.org/drawingml/2006/main" xmlns:r="http://schemas.openxmlformats.org/officeDocument/2006/relationships" xmlns:p="http://schemas.openxmlformats.org/presentationml/2006/main">
+  <p:cSld>
+    <p:spTree>
+      <p:nvGrpSpPr>
+        <p:cNvPr id="1" name=""/>
+        <p:cNvGrpSpPr/>
+        <p:nvPr/>
+      </p:nvGrpSpPr>
+      <p:grpSpPr>
+        <a:xfrm>
+          <a:off x="0" y="0"/>
+          <a:ext cx="0" cy="0"/>
+          <a:chOff x="0" y="0"/>
+          <a:chExt cx="0" cy="0"/>
+        </a:xfrm>
+      </p:grpSpPr>
+      <p:sp>
+        <p:nvSpPr>
+          <p:cNvPr id="6" name="Subtitle 2"/>
+          <p:cNvSpPr txBox="1">
+            <a:spLocks/>
+          </p:cNvSpPr>
+          <p:nvPr/>
+        </p:nvSpPr>
+        <p:spPr>
+          <a:xfrm>
+            <a:off x="0" y="5461462"/>
+            <a:ext cx="9129299" cy="227676"/>
+          </a:xfrm>
+          <a:prstGeom prst="rect">
+            <a:avLst/>
+          </a:prstGeom>
+        </p:spPr>
+        <p:txBody>
+          <a:bodyPr vert="horz" lIns="91440" tIns="45720" rIns="91440" bIns="45720" rtlCol="0">
+            <a:normAutofit fontScale="92500" lnSpcReduction="20000"/>
+          </a:bodyPr>
+          <a:lstStyle/>
+          <a:p>
+            <a:pPr marL="0" marR="0" lvl="0" indent="0" algn="ctr" defTabSz="457200" rtl="0" eaLnBrk="1" fontAlgn="auto" latinLnBrk="0" hangingPunct="1">
+              <a:lnSpc>
+                <a:spcPct val="100000"/>
+              </a:lnSpc>
+              <a:spcBef>
+                <a:spcPct val="20000"/>
+              </a:spcBef>
+              <a:spcAft>
+                <a:spcPts val="0"/>
+              </a:spcAft>
+              <a:buClrTx/>
+              <a:buSzTx/>
+              <a:buFont typeface="Arial"/>
+              <a:buNone/>
+              <a:tabLst/>
+              <a:defRPr/>
+            </a:pPr>
+            <a:r>
+              <a:rPr kumimoji="0" lang="en-US" sz="1200" i="1" u="none" strike="noStrike" kern="1200" cap="none" spc="0" normalizeH="0" baseline="0" noProof="0" dirty="0" smtClean="0">
+                <a:effectLst/>
+                <a:uLnTx/>
+                <a:uFillTx/>
+                <a:latin typeface="Times New Roman"/>
+                <a:ea typeface="+mn-ea"/>
+                <a:cs typeface="Times New Roman"/>
+              </a:rPr>
+              <a:t>Pun Counter</a:t>
+            </a:r>
+            <a:r>
+              <a:rPr kumimoji="0" lang="en-US" sz="1200" i="1" u="none" strike="noStrike" kern="1200" cap="none" spc="0" normalizeH="0" baseline="0" noProof="0" smtClean="0">
+                <a:effectLst/>
+                <a:uLnTx/>
+                <a:uFillTx/>
+                <a:latin typeface="Times New Roman"/>
+                <a:ea typeface="+mn-ea"/>
+                <a:cs typeface="Times New Roman"/>
+              </a:rPr>
+              <a:t>: 10</a:t>
+            </a:r>
+            <a:endParaRPr kumimoji="0" lang="en-US" sz="1200" i="1" u="none" strike="noStrike" kern="1200" cap="none" spc="0" normalizeH="0" baseline="0" noProof="0" dirty="0" smtClean="0">
+              <a:effectLst/>
+              <a:uLnTx/>
+              <a:uFillTx/>
+              <a:latin typeface="Times New Roman"/>
+              <a:ea typeface="+mn-ea"/>
+              <a:cs typeface="Times New Roman"/>
+            </a:endParaRPr>
+          </a:p>
+        </p:txBody>
+      </p:sp>
+      <p:sp>
+        <p:nvSpPr>
+          <p:cNvPr id="5" name="TextBox 4"/>
+          <p:cNvSpPr txBox="1"/>
+          <p:nvPr/>
+        </p:nvSpPr>
+        <p:spPr>
+          <a:xfrm>
+            <a:off x="943687" y="977900"/>
+            <a:ext cx="7399800" cy="3200876"/>
+          </a:xfrm>
+          <a:prstGeom prst="rect">
+            <a:avLst/>
+          </a:prstGeom>
+          <a:noFill/>
+        </p:spPr>
+        <p:txBody>
+          <a:bodyPr wrap="square" rtlCol="0">
+            <a:spAutoFit/>
+          </a:bodyPr>
+          <a:lstStyle/>
+          <a:p>
+            <a:pPr lvl="0">
+              <a:spcBef>
+                <a:spcPct val="0"/>
+              </a:spcBef>
+              <a:defRPr/>
+            </a:pPr>
+            <a:r>
+              <a:rPr lang="en-US" sz="2400" b="1" dirty="0" err="1" smtClean="0">
+                <a:latin typeface="Arial"/>
+                <a:cs typeface="Arial"/>
+              </a:rPr>
+              <a:t>Git</a:t>
+            </a:r>
+            <a:r>
+              <a:rPr lang="en-US" sz="2400" b="1" dirty="0" smtClean="0">
+                <a:latin typeface="Arial"/>
+                <a:cs typeface="Arial"/>
+              </a:rPr>
+              <a:t> Healthy Practices</a:t>
+            </a:r>
+            <a:endParaRPr lang="en-US" sz="2400" b="1" dirty="0" smtClean="0">
+              <a:latin typeface="Arial"/>
+              <a:cs typeface="Arial"/>
+            </a:endParaRPr>
+          </a:p>
+          <a:p>
+            <a:pPr lvl="0">
+              <a:spcBef>
+                <a:spcPct val="0"/>
+              </a:spcBef>
+              <a:defRPr/>
+            </a:pPr>
+            <a:endParaRPr lang="en-US" sz="2400" b="1" dirty="0" smtClean="0">
+              <a:latin typeface="Arial"/>
+              <a:cs typeface="Arial"/>
+            </a:endParaRPr>
+          </a:p>
+          <a:p>
+            <a:pPr marL="342900" lvl="0" indent="-342900">
+              <a:spcBef>
+                <a:spcPct val="0"/>
+              </a:spcBef>
+              <a:buFont typeface="Arial" panose="020B0604020202020204" pitchFamily="34" charset="0"/>
+              <a:buChar char="•"/>
+              <a:defRPr/>
+            </a:pPr>
+            <a:r>
+              <a:rPr lang="en-US" sz="1400" dirty="0" smtClean="0">
+                <a:solidFill>
+                  <a:schemeClr val="bg2">
+                    <a:lumMod val="10000"/>
+                  </a:schemeClr>
+                </a:solidFill>
+                <a:latin typeface="Arial" panose="020B0604020202020204" pitchFamily="34" charset="0"/>
+                <a:cs typeface="Arial" panose="020B0604020202020204" pitchFamily="34" charset="0"/>
+              </a:rPr>
+              <a:t>Common procedure: Pull </a:t>
+            </a:r>
+            <a:r>
+              <a:rPr lang="en-US" sz="1400" dirty="0" smtClean="0">
+                <a:solidFill>
+                  <a:schemeClr val="bg2">
+                    <a:lumMod val="10000"/>
+                  </a:schemeClr>
+                </a:solidFill>
+                <a:latin typeface="Arial" panose="020B0604020202020204" pitchFamily="34" charset="0"/>
+                <a:cs typeface="Arial" panose="020B0604020202020204" pitchFamily="34" charset="0"/>
+                <a:sym typeface="Wingdings" panose="05000000000000000000" pitchFamily="2" charset="2"/>
+              </a:rPr>
+              <a:t> Write your code -&gt; Add -&gt; Pull -&gt; Resolve any conflicts -&gt; commit -&gt; Push</a:t>
+            </a:r>
+          </a:p>
+          <a:p>
+            <a:pPr marL="342900" lvl="0" indent="-342900">
+              <a:spcBef>
+                <a:spcPct val="0"/>
+              </a:spcBef>
+              <a:buFont typeface="Arial" panose="020B0604020202020204" pitchFamily="34" charset="0"/>
+              <a:buChar char="•"/>
+              <a:defRPr/>
+            </a:pPr>
+            <a:endParaRPr lang="en-US" sz="1400" dirty="0" smtClean="0">
+              <a:solidFill>
+                <a:schemeClr val="bg2">
+                  <a:lumMod val="10000"/>
+                </a:schemeClr>
+              </a:solidFill>
+              <a:latin typeface="Arial" panose="020B0604020202020204" pitchFamily="34" charset="0"/>
+              <a:cs typeface="Arial" panose="020B0604020202020204" pitchFamily="34" charset="0"/>
+              <a:sym typeface="Wingdings" panose="05000000000000000000" pitchFamily="2" charset="2"/>
+            </a:endParaRPr>
+          </a:p>
+          <a:p>
+            <a:pPr marL="342900" lvl="0" indent="-342900">
+              <a:spcBef>
+                <a:spcPct val="0"/>
+              </a:spcBef>
+              <a:buFont typeface="Arial" panose="020B0604020202020204" pitchFamily="34" charset="0"/>
+              <a:buChar char="•"/>
+              <a:defRPr/>
+            </a:pPr>
+            <a:r>
+              <a:rPr lang="en-US" sz="1400" dirty="0" smtClean="0">
+                <a:solidFill>
+                  <a:schemeClr val="bg2">
+                    <a:lumMod val="10000"/>
+                  </a:schemeClr>
+                </a:solidFill>
+                <a:latin typeface="Arial" panose="020B0604020202020204" pitchFamily="34" charset="0"/>
+                <a:cs typeface="Arial" panose="020B0604020202020204" pitchFamily="34" charset="0"/>
+                <a:sym typeface="Wingdings" panose="05000000000000000000" pitchFamily="2" charset="2"/>
+              </a:rPr>
+              <a:t>Never have something broken on the master branch</a:t>
+            </a:r>
+          </a:p>
+          <a:p>
+            <a:pPr marL="342900" lvl="0" indent="-342900">
+              <a:spcBef>
+                <a:spcPct val="0"/>
+              </a:spcBef>
+              <a:buFont typeface="Arial" panose="020B0604020202020204" pitchFamily="34" charset="0"/>
+              <a:buChar char="•"/>
+              <a:defRPr/>
+            </a:pPr>
+            <a:endParaRPr lang="en-US" sz="1400" dirty="0" smtClean="0">
+              <a:solidFill>
+                <a:schemeClr val="bg2">
+                  <a:lumMod val="10000"/>
+                </a:schemeClr>
+              </a:solidFill>
+              <a:latin typeface="Arial" panose="020B0604020202020204" pitchFamily="34" charset="0"/>
+              <a:cs typeface="Arial" panose="020B0604020202020204" pitchFamily="34" charset="0"/>
+              <a:sym typeface="Wingdings" panose="05000000000000000000" pitchFamily="2" charset="2"/>
+            </a:endParaRPr>
+          </a:p>
+          <a:p>
+            <a:pPr marL="342900" lvl="0" indent="-342900">
+              <a:spcBef>
+                <a:spcPct val="0"/>
+              </a:spcBef>
+              <a:buFont typeface="Arial" panose="020B0604020202020204" pitchFamily="34" charset="0"/>
+              <a:buChar char="•"/>
+              <a:defRPr/>
+            </a:pPr>
+            <a:r>
+              <a:rPr lang="en-US" sz="1400" dirty="0" smtClean="0">
+                <a:solidFill>
+                  <a:schemeClr val="bg2">
+                    <a:lumMod val="10000"/>
+                  </a:schemeClr>
+                </a:solidFill>
+                <a:latin typeface="Arial" panose="020B0604020202020204" pitchFamily="34" charset="0"/>
+                <a:cs typeface="Arial" panose="020B0604020202020204" pitchFamily="34" charset="0"/>
+                <a:sym typeface="Wingdings" panose="05000000000000000000" pitchFamily="2" charset="2"/>
+              </a:rPr>
+              <a:t>Work on a branch and only merge if you are sure it’s working (and your teammates know you are merging to master branch)</a:t>
+            </a:r>
+          </a:p>
+          <a:p>
+            <a:pPr marL="342900" lvl="0" indent="-342900">
+              <a:spcBef>
+                <a:spcPct val="0"/>
+              </a:spcBef>
+              <a:buFont typeface="Arial" panose="020B0604020202020204" pitchFamily="34" charset="0"/>
+              <a:buChar char="•"/>
+              <a:defRPr/>
+            </a:pPr>
+            <a:endParaRPr lang="en-US" sz="1400" dirty="0" smtClean="0">
+              <a:solidFill>
+                <a:schemeClr val="bg2">
+                  <a:lumMod val="10000"/>
+                </a:schemeClr>
+              </a:solidFill>
+              <a:latin typeface="Arial" panose="020B0604020202020204" pitchFamily="34" charset="0"/>
+              <a:cs typeface="Arial" panose="020B0604020202020204" pitchFamily="34" charset="0"/>
+              <a:sym typeface="Wingdings" panose="05000000000000000000" pitchFamily="2" charset="2"/>
+            </a:endParaRPr>
+          </a:p>
+          <a:p>
+            <a:pPr marL="342900" lvl="0" indent="-342900">
+              <a:spcBef>
+                <a:spcPct val="0"/>
+              </a:spcBef>
+              <a:buFont typeface="Arial" panose="020B0604020202020204" pitchFamily="34" charset="0"/>
+              <a:buChar char="•"/>
+              <a:defRPr/>
+            </a:pPr>
+            <a:r>
+              <a:rPr lang="en-US" sz="1400" dirty="0" err="1" smtClean="0">
+                <a:solidFill>
+                  <a:schemeClr val="bg2">
+                    <a:lumMod val="10000"/>
+                  </a:schemeClr>
+                </a:solidFill>
+                <a:latin typeface="Arial" panose="020B0604020202020204" pitchFamily="34" charset="0"/>
+                <a:cs typeface="Arial" panose="020B0604020202020204" pitchFamily="34" charset="0"/>
+                <a:sym typeface="Wingdings" panose="05000000000000000000" pitchFamily="2" charset="2"/>
+              </a:rPr>
+              <a:t>Git</a:t>
+            </a:r>
+            <a:r>
+              <a:rPr lang="en-US" sz="1400" dirty="0" smtClean="0">
+                <a:solidFill>
+                  <a:schemeClr val="bg2">
+                    <a:lumMod val="10000"/>
+                  </a:schemeClr>
+                </a:solidFill>
+                <a:latin typeface="Arial" panose="020B0604020202020204" pitchFamily="34" charset="0"/>
+                <a:cs typeface="Arial" panose="020B0604020202020204" pitchFamily="34" charset="0"/>
+                <a:sym typeface="Wingdings" panose="05000000000000000000" pitchFamily="2" charset="2"/>
+              </a:rPr>
+              <a:t> pull before you start your work</a:t>
+            </a:r>
+          </a:p>
+          <a:p>
+            <a:pPr marL="342900" lvl="0" indent="-342900">
+              <a:spcBef>
+                <a:spcPct val="0"/>
+              </a:spcBef>
+              <a:buFont typeface="Arial" panose="020B0604020202020204" pitchFamily="34" charset="0"/>
+              <a:buChar char="•"/>
+              <a:defRPr/>
+            </a:pPr>
+            <a:endParaRPr lang="en-US" sz="1400" dirty="0" smtClean="0">
+              <a:solidFill>
+                <a:schemeClr val="bg2">
+                  <a:lumMod val="10000"/>
+                </a:schemeClr>
+              </a:solidFill>
+              <a:latin typeface="Arial" panose="020B0604020202020204" pitchFamily="34" charset="0"/>
+              <a:cs typeface="Arial" panose="020B0604020202020204" pitchFamily="34" charset="0"/>
+              <a:sym typeface="Wingdings" panose="05000000000000000000" pitchFamily="2" charset="2"/>
+            </a:endParaRPr>
+          </a:p>
+          <a:p>
+            <a:pPr marL="342900" lvl="0" indent="-342900">
+              <a:spcBef>
+                <a:spcPct val="0"/>
+              </a:spcBef>
+              <a:buFont typeface="Arial" panose="020B0604020202020204" pitchFamily="34" charset="0"/>
+              <a:buChar char="•"/>
+              <a:defRPr/>
+            </a:pPr>
+            <a:r>
+              <a:rPr lang="en-US" sz="1400" dirty="0" smtClean="0">
+                <a:solidFill>
+                  <a:schemeClr val="bg2">
+                    <a:lumMod val="10000"/>
+                  </a:schemeClr>
+                </a:solidFill>
+                <a:latin typeface="Arial" panose="020B0604020202020204" pitchFamily="34" charset="0"/>
+                <a:cs typeface="Arial" panose="020B0604020202020204" pitchFamily="34" charset="0"/>
+                <a:sym typeface="Wingdings" panose="05000000000000000000" pitchFamily="2" charset="2"/>
+              </a:rPr>
+              <a:t>Push little commits frequently, instead of large commits infrequently</a:t>
+            </a:r>
+            <a:endParaRPr lang="en-US" sz="1400" dirty="0" smtClean="0">
+              <a:solidFill>
+                <a:schemeClr val="bg2">
+                  <a:lumMod val="10000"/>
+                </a:schemeClr>
+              </a:solidFill>
+              <a:latin typeface="Arial" panose="020B0604020202020204" pitchFamily="34" charset="0"/>
+              <a:cs typeface="Arial" panose="020B0604020202020204" pitchFamily="34" charset="0"/>
+            </a:endParaRPr>
+          </a:p>
+        </p:txBody>
+      </p:sp>
+    </p:spTree>
+    <p:extLst>
+      <p:ext uri="{BB962C8B-B14F-4D97-AF65-F5344CB8AC3E}">
+        <p14:creationId xmlns:p14="http://schemas.microsoft.com/office/powerpoint/2010/main" val="38081696"/>
+      </p:ext>
+    </p:extLst>
+  </p:cSld>
+  <p:clrMapOvr>
+    <a:masterClrMapping/>
+  </p:clrMapOvr>
 </p:sld>
 </file>
 
@@ -4139,13 +4826,6 @@
   <p:clrMapOvr>
     <a:masterClrMapping/>
   </p:clrMapOvr>
-  <p:timing>
-    <p:tnLst>
-      <p:par>
-        <p:cTn id="1" dur="indefinite" restart="never" nodeType="tmRoot"/>
-      </p:par>
-    </p:tnLst>
-  </p:timing>
 </p:sld>
 </file>
 
@@ -4523,17 +5203,7 @@
                 <a:latin typeface="Arial"/>
                 <a:cs typeface="Arial"/>
               </a:rPr>
-              <a:t>“Screw Blackboard, let’s </a:t>
-            </a:r>
-            <a:r>
-              <a:rPr lang="en-US" i="1" dirty="0" smtClean="0">
-                <a:solidFill>
-                  <a:srgbClr val="323232"/>
-                </a:solidFill>
-                <a:latin typeface="Arial"/>
-                <a:cs typeface="Arial"/>
-              </a:rPr>
-              <a:t>use </a:t>
+              <a:t>“Screw Blackboard, let’s use </a:t>
             </a:r>
             <a:r>
               <a:rPr lang="en-US" i="1" dirty="0" err="1" smtClean="0">
@@ -5547,13 +6217,6 @@
   <p:clrMapOvr>
     <a:masterClrMapping/>
   </p:clrMapOvr>
-  <p:timing>
-    <p:tnLst>
-      <p:par>
-        <p:cTn id="1" dur="indefinite" restart="never" nodeType="tmRoot"/>
-      </p:par>
-    </p:tnLst>
-  </p:timing>
 </p:sld>
 </file>
 
@@ -5857,13 +6520,6 @@
   <p:clrMapOvr>
     <a:masterClrMapping/>
   </p:clrMapOvr>
-  <p:timing>
-    <p:tnLst>
-      <p:par>
-        <p:cTn id="1" dur="indefinite" restart="never" nodeType="tmRoot"/>
-      </p:par>
-    </p:tnLst>
-  </p:timing>
 </p:sld>
 </file>
 
@@ -6520,13 +7176,6 @@
   <p:clrMapOvr>
     <a:masterClrMapping/>
   </p:clrMapOvr>
-  <p:timing>
-    <p:tnLst>
-      <p:par>
-        <p:cTn id="1" dur="indefinite" restart="never" nodeType="tmRoot"/>
-      </p:par>
-    </p:tnLst>
-  </p:timing>
 </p:sld>
 </file>
 
@@ -6743,13 +7392,6 @@
   <p:clrMapOvr>
     <a:masterClrMapping/>
   </p:clrMapOvr>
-  <p:timing>
-    <p:tnLst>
-      <p:par>
-        <p:cTn id="1" dur="indefinite" restart="never" nodeType="tmRoot"/>
-      </p:par>
-    </p:tnLst>
-  </p:timing>
 </p:sld>
 </file>
 
@@ -6966,13 +7608,6 @@
   <p:clrMapOvr>
     <a:masterClrMapping/>
   </p:clrMapOvr>
-  <p:timing>
-    <p:tnLst>
-      <p:par>
-        <p:cTn id="1" dur="indefinite" restart="never" nodeType="tmRoot"/>
-      </p:par>
-    </p:tnLst>
-  </p:timing>
 </p:sld>
 </file>
 
@@ -7441,15 +8076,6 @@
               </a:rPr>
               <a:t>Loads designated commit state to your local machine</a:t>
             </a:r>
-            <a:endParaRPr lang="en-US" sz="1400" dirty="0" smtClean="0">
-              <a:solidFill>
-                <a:schemeClr val="bg2">
-                  <a:lumMod val="10000"/>
-                </a:schemeClr>
-              </a:solidFill>
-              <a:latin typeface="Arial"/>
-              <a:cs typeface="Arial"/>
-            </a:endParaRPr>
           </a:p>
           <a:p>
             <a:pPr marL="800100" lvl="1" indent="-342900">
@@ -7604,13 +8230,6 @@
   <p:clrMapOvr>
     <a:masterClrMapping/>
   </p:clrMapOvr>
-  <p:timing>
-    <p:tnLst>
-      <p:par>
-        <p:cTn id="1" dur="indefinite" restart="never" nodeType="tmRoot"/>
-      </p:par>
-    </p:tnLst>
-  </p:timing>
 </p:sld>
 </file>
 

</xml_diff>